<commit_message>
Changes for APSIM.Shared. Updated powerpoint design slide. Added call to Farm4Prophet web service to return results.
</commit_message>
<xml_diff>
--- a/Design.pptx
+++ b/Design.pptx
@@ -243,7 +243,7 @@
           <a:p>
             <a:fld id="{EB899B48-2143-49F9-BB3C-6454B1D3E096}" type="datetimeFigureOut">
               <a:rPr lang="en-AU" smtClean="0"/>
-              <a:t>27/01/2015</a:t>
+              <a:t>18/05/2015</a:t>
             </a:fld>
             <a:endParaRPr lang="en-AU"/>
           </a:p>
@@ -413,7 +413,7 @@
           <a:p>
             <a:fld id="{EB899B48-2143-49F9-BB3C-6454B1D3E096}" type="datetimeFigureOut">
               <a:rPr lang="en-AU" smtClean="0"/>
-              <a:t>27/01/2015</a:t>
+              <a:t>18/05/2015</a:t>
             </a:fld>
             <a:endParaRPr lang="en-AU"/>
           </a:p>
@@ -593,7 +593,7 @@
           <a:p>
             <a:fld id="{EB899B48-2143-49F9-BB3C-6454B1D3E096}" type="datetimeFigureOut">
               <a:rPr lang="en-AU" smtClean="0"/>
-              <a:t>27/01/2015</a:t>
+              <a:t>18/05/2015</a:t>
             </a:fld>
             <a:endParaRPr lang="en-AU"/>
           </a:p>
@@ -763,7 +763,7 @@
           <a:p>
             <a:fld id="{EB899B48-2143-49F9-BB3C-6454B1D3E096}" type="datetimeFigureOut">
               <a:rPr lang="en-AU" smtClean="0"/>
-              <a:t>27/01/2015</a:t>
+              <a:t>18/05/2015</a:t>
             </a:fld>
             <a:endParaRPr lang="en-AU"/>
           </a:p>
@@ -1009,7 +1009,7 @@
           <a:p>
             <a:fld id="{EB899B48-2143-49F9-BB3C-6454B1D3E096}" type="datetimeFigureOut">
               <a:rPr lang="en-AU" smtClean="0"/>
-              <a:t>27/01/2015</a:t>
+              <a:t>18/05/2015</a:t>
             </a:fld>
             <a:endParaRPr lang="en-AU"/>
           </a:p>
@@ -1241,7 +1241,7 @@
           <a:p>
             <a:fld id="{EB899B48-2143-49F9-BB3C-6454B1D3E096}" type="datetimeFigureOut">
               <a:rPr lang="en-AU" smtClean="0"/>
-              <a:t>27/01/2015</a:t>
+              <a:t>18/05/2015</a:t>
             </a:fld>
             <a:endParaRPr lang="en-AU"/>
           </a:p>
@@ -1608,7 +1608,7 @@
           <a:p>
             <a:fld id="{EB899B48-2143-49F9-BB3C-6454B1D3E096}" type="datetimeFigureOut">
               <a:rPr lang="en-AU" smtClean="0"/>
-              <a:t>27/01/2015</a:t>
+              <a:t>18/05/2015</a:t>
             </a:fld>
             <a:endParaRPr lang="en-AU"/>
           </a:p>
@@ -1726,7 +1726,7 @@
           <a:p>
             <a:fld id="{EB899B48-2143-49F9-BB3C-6454B1D3E096}" type="datetimeFigureOut">
               <a:rPr lang="en-AU" smtClean="0"/>
-              <a:t>27/01/2015</a:t>
+              <a:t>18/05/2015</a:t>
             </a:fld>
             <a:endParaRPr lang="en-AU"/>
           </a:p>
@@ -1821,7 +1821,7 @@
           <a:p>
             <a:fld id="{EB899B48-2143-49F9-BB3C-6454B1D3E096}" type="datetimeFigureOut">
               <a:rPr lang="en-AU" smtClean="0"/>
-              <a:t>27/01/2015</a:t>
+              <a:t>18/05/2015</a:t>
             </a:fld>
             <a:endParaRPr lang="en-AU"/>
           </a:p>
@@ -2098,7 +2098,7 @@
           <a:p>
             <a:fld id="{EB899B48-2143-49F9-BB3C-6454B1D3E096}" type="datetimeFigureOut">
               <a:rPr lang="en-AU" smtClean="0"/>
-              <a:t>27/01/2015</a:t>
+              <a:t>18/05/2015</a:t>
             </a:fld>
             <a:endParaRPr lang="en-AU"/>
           </a:p>
@@ -2351,7 +2351,7 @@
           <a:p>
             <a:fld id="{EB899B48-2143-49F9-BB3C-6454B1D3E096}" type="datetimeFigureOut">
               <a:rPr lang="en-AU" smtClean="0"/>
-              <a:t>27/01/2015</a:t>
+              <a:t>18/05/2015</a:t>
             </a:fld>
             <a:endParaRPr lang="en-AU"/>
           </a:p>
@@ -2564,7 +2564,7 @@
           <a:p>
             <a:fld id="{EB899B48-2143-49F9-BB3C-6454B1D3E096}" type="datetimeFigureOut">
               <a:rPr lang="en-AU" smtClean="0"/>
-              <a:t>27/01/2015</a:t>
+              <a:t>18/05/2015</a:t>
             </a:fld>
             <a:endParaRPr lang="en-AU"/>
           </a:p>
@@ -2971,101 +2971,16 @@
       </p:grpSpPr>
       <p:grpSp>
         <p:nvGrpSpPr>
-          <p:cNvPr id="22" name="Group 21"/>
-          <p:cNvGrpSpPr/>
-          <p:nvPr/>
-        </p:nvGrpSpPr>
-        <p:grpSpPr>
-          <a:xfrm>
-            <a:off x="124959" y="188560"/>
-            <a:ext cx="2379407" cy="1640240"/>
-            <a:chOff x="124959" y="188560"/>
-            <a:chExt cx="2379407" cy="1640240"/>
-          </a:xfrm>
-        </p:grpSpPr>
-        <p:sp>
-          <p:nvSpPr>
-            <p:cNvPr id="20" name="Round Same Side Corner Rectangle 19"/>
-            <p:cNvSpPr/>
-            <p:nvPr/>
-          </p:nvSpPr>
-          <p:spPr>
-            <a:xfrm>
-              <a:off x="124959" y="188560"/>
-              <a:ext cx="2379407" cy="1640240"/>
-            </a:xfrm>
-            <a:prstGeom prst="round2SameRect">
-              <a:avLst/>
-            </a:prstGeom>
-            <a:solidFill>
-              <a:schemeClr val="accent1">
-                <a:lumMod val="20000"/>
-                <a:lumOff val="80000"/>
-              </a:schemeClr>
-            </a:solidFill>
-          </p:spPr>
-          <p:style>
-            <a:lnRef idx="2">
-              <a:schemeClr val="accent1">
-                <a:shade val="50000"/>
-              </a:schemeClr>
-            </a:lnRef>
-            <a:fillRef idx="1">
-              <a:schemeClr val="accent1"/>
-            </a:fillRef>
-            <a:effectRef idx="0">
-              <a:schemeClr val="accent1"/>
-            </a:effectRef>
-            <a:fontRef idx="minor">
-              <a:schemeClr val="lt1"/>
-            </a:fontRef>
-          </p:style>
-          <p:txBody>
-            <a:bodyPr rtlCol="0" anchor="ctr"/>
-            <a:lstStyle/>
-            <a:p>
-              <a:pPr algn="ctr"/>
-              <a:endParaRPr lang="en-AU" sz="1200"/>
-            </a:p>
-          </p:txBody>
-        </p:sp>
-        <p:pic>
-          <p:nvPicPr>
-            <p:cNvPr id="48" name="Picture 47"/>
-            <p:cNvPicPr>
-              <a:picLocks noChangeAspect="1"/>
-            </p:cNvPicPr>
-            <p:nvPr/>
-          </p:nvPicPr>
-          <p:blipFill>
-            <a:blip r:embed="rId2"/>
-            <a:stretch>
-              <a:fillRect/>
-            </a:stretch>
-          </p:blipFill>
-          <p:spPr>
-            <a:xfrm>
-              <a:off x="556596" y="1013787"/>
-              <a:ext cx="1516132" cy="734552"/>
-            </a:xfrm>
-            <a:prstGeom prst="rect">
-              <a:avLst/>
-            </a:prstGeom>
-          </p:spPr>
-        </p:pic>
-      </p:grpSp>
-      <p:grpSp>
-        <p:nvGrpSpPr>
           <p:cNvPr id="55" name="Group 54"/>
           <p:cNvGrpSpPr/>
           <p:nvPr/>
         </p:nvGrpSpPr>
         <p:grpSpPr>
           <a:xfrm>
-            <a:off x="7856896" y="5495800"/>
-            <a:ext cx="3189985" cy="830997"/>
+            <a:off x="8026983" y="4506067"/>
+            <a:ext cx="3189985" cy="539425"/>
             <a:chOff x="9319256" y="2918031"/>
-            <a:chExt cx="3189985" cy="830997"/>
+            <a:chExt cx="3189985" cy="539425"/>
           </a:xfrm>
         </p:grpSpPr>
         <p:sp>
@@ -3117,7 +3032,7 @@
           <p:spPr>
             <a:xfrm>
               <a:off x="9430750" y="2918031"/>
-              <a:ext cx="3078491" cy="830997"/>
+              <a:ext cx="3078491" cy="461665"/>
             </a:xfrm>
             <a:prstGeom prst="rect">
               <a:avLst/>
@@ -3133,31 +3048,29 @@
               <a:pPr algn="ctr"/>
               <a:r>
                 <a:rPr lang="en-US" sz="1200" b="1" dirty="0" smtClean="0"/>
-                <a:t>Jobs Database: </a:t>
+                <a:t>Jobs </a:t>
               </a:r>
+              <a:r>
+                <a:rPr lang="en-US" sz="1200" b="1" dirty="0" smtClean="0"/>
+                <a:t>Table: </a:t>
+              </a:r>
+              <a:endParaRPr lang="en-US" sz="1200" b="1" dirty="0" smtClean="0"/>
             </a:p>
             <a:p>
               <a:pPr algn="ctr"/>
               <a:r>
                 <a:rPr lang="en-US" sz="1200" dirty="0" smtClean="0"/>
-                <a:t>The database </a:t>
+                <a:t>Contains </a:t>
               </a:r>
               <a:r>
                 <a:rPr lang="en-US" sz="1200" dirty="0" smtClean="0"/>
-                <a:t>containing all jobs.</a:t>
+                <a:t>all jobs</a:t>
               </a:r>
-            </a:p>
-            <a:p>
-              <a:pPr algn="ctr"/>
               <a:r>
-                <a:rPr lang="en-US" sz="1200" dirty="0"/>
-                <a:t>Fields: [ID, Name, XML, Status, URL]</a:t>
+                <a:rPr lang="en-US" sz="1200" dirty="0" smtClean="0"/>
+                <a:t>.</a:t>
               </a:r>
-              <a:endParaRPr lang="en-AU" sz="1200" dirty="0"/>
-            </a:p>
-            <a:p>
-              <a:pPr algn="ctr"/>
-              <a:endParaRPr lang="en-AU" sz="1200" dirty="0"/>
+              <a:endParaRPr lang="en-US" sz="1200" dirty="0" smtClean="0"/>
             </a:p>
           </p:txBody>
         </p:sp>
@@ -3187,7 +3100,7 @@
             <a:pPr algn="ctr"/>
             <a:r>
               <a:rPr lang="en-AU" sz="1200" b="1" dirty="0" err="1" smtClean="0"/>
-              <a:t>APSIM.Cloud.WebService</a:t>
+              <a:t>APSIM.Cloud.Service</a:t>
             </a:r>
             <a:endParaRPr lang="en-AU" sz="1200" b="1" dirty="0" smtClean="0"/>
           </a:p>
@@ -3195,7 +3108,15 @@
             <a:pPr algn="ctr"/>
             <a:r>
               <a:rPr lang="en-AU" sz="1200" dirty="0" smtClean="0"/>
-              <a:t>Web service for adding, removing, exploring cloud jobs</a:t>
+              <a:t>Web service for adding, removing, </a:t>
+            </a:r>
+            <a:r>
+              <a:rPr lang="en-AU" sz="1200" dirty="0" smtClean="0"/>
+              <a:t>cloud </a:t>
+            </a:r>
+            <a:r>
+              <a:rPr lang="en-AU" sz="1200" dirty="0" smtClean="0"/>
+              <a:t>jobs</a:t>
             </a:r>
           </a:p>
           <a:p>
@@ -3212,8 +3133,8 @@
         </p:nvGrpSpPr>
         <p:grpSpPr>
           <a:xfrm>
-            <a:off x="2114285" y="5071691"/>
-            <a:ext cx="4769509" cy="1619371"/>
+            <a:off x="274099" y="4967732"/>
+            <a:ext cx="4038410" cy="1619371"/>
             <a:chOff x="3115418" y="1699766"/>
             <a:chExt cx="4769509" cy="1619371"/>
           </a:xfrm>
@@ -3273,7 +3194,7 @@
           <p:spPr>
             <a:xfrm>
               <a:off x="3115418" y="1723995"/>
-              <a:ext cx="1836400" cy="276999"/>
+              <a:ext cx="1704762" cy="276999"/>
             </a:xfrm>
             <a:prstGeom prst="rect">
               <a:avLst/>
@@ -3288,7 +3209,7 @@
             <a:p>
               <a:r>
                 <a:rPr lang="en-AU" sz="1200" b="1" dirty="0" smtClean="0"/>
-                <a:t>APSIM.Cloud.Services.exe</a:t>
+                <a:t>APSIM.Cloud.Shared.dll</a:t>
               </a:r>
               <a:endParaRPr lang="en-AU" sz="1200" b="1" dirty="0"/>
             </a:p>
@@ -3339,35 +3260,40 @@
             <a:p>
               <a:r>
                 <a:rPr lang="en-AU" sz="1200" b="1" dirty="0" err="1" smtClean="0"/>
-                <a:t>JobsDB</a:t>
-              </a:r>
-              <a:r>
-                <a:rPr lang="en-AU" sz="1200" b="1" dirty="0" smtClean="0"/>
-                <a:t>: </a:t>
+                <a:t>APSIMSpec</a:t>
               </a:r>
               <a:r>
                 <a:rPr lang="en-AU" sz="1200" dirty="0" smtClean="0"/>
-                <a:t>Methods for reading / writing jobs database.</a:t>
+                <a:t>: Specification for an APSIM simulation</a:t>
+              </a:r>
+              <a:r>
+                <a:rPr lang="en-AU" sz="1200" dirty="0" smtClean="0"/>
+                <a:t>.</a:t>
               </a:r>
             </a:p>
             <a:p>
               <a:r>
                 <a:rPr lang="en-AU" sz="1200" b="1" dirty="0" err="1" smtClean="0"/>
-                <a:t>SimulationSpec</a:t>
+                <a:t>YieldProphetSpec</a:t>
               </a:r>
               <a:r>
                 <a:rPr lang="en-AU" sz="1200" dirty="0" smtClean="0"/>
-                <a:t>: Specification for an APSIM simulation.</a:t>
+                <a:t>: Specification for a YP simulation(s).</a:t>
               </a:r>
+              <a:endParaRPr lang="en-AU" sz="1200" dirty="0" smtClean="0"/>
             </a:p>
             <a:p>
               <a:r>
-                <a:rPr lang="en-AU" sz="1200" b="1" dirty="0" err="1"/>
-                <a:t>YPXMLToJobSpec</a:t>
+                <a:rPr lang="en-AU" sz="1200" b="1" dirty="0" err="1" smtClean="0"/>
+                <a:t>YieldProphetOld</a:t>
+              </a:r>
+              <a:r>
+                <a:rPr lang="en-AU" sz="1200" dirty="0" smtClean="0"/>
+                <a:t>: </a:t>
               </a:r>
               <a:r>
                 <a:rPr lang="en-AU" sz="1200" dirty="0"/>
-                <a:t>: Converts old YP XML to </a:t>
+                <a:t>Converts old YP XML to </a:t>
               </a:r>
               <a:r>
                 <a:rPr lang="en-AU" sz="1200" dirty="0" smtClean="0"/>
@@ -3381,12 +3307,13 @@
             <a:p>
               <a:r>
                 <a:rPr lang="en-AU" sz="1200" b="1" dirty="0" err="1" smtClean="0"/>
-                <a:t>CreateAPSIMFilesFromJobSpec</a:t>
+                <a:t>YieldProphetUtility</a:t>
               </a:r>
               <a:r>
                 <a:rPr lang="en-AU" sz="1200" dirty="0" smtClean="0"/>
-                <a:t>: Creates APSIM files from a job spec.</a:t>
+                <a:t>: Variables utility functions.</a:t>
               </a:r>
+              <a:endParaRPr lang="en-AU" sz="1200" dirty="0" smtClean="0"/>
             </a:p>
             <a:p>
               <a:endParaRPr lang="en-AU" sz="1200" dirty="0" smtClean="0"/>
@@ -3394,574 +3321,475 @@
           </p:txBody>
         </p:sp>
       </p:grpSp>
-      <p:grpSp>
-        <p:nvGrpSpPr>
-          <p:cNvPr id="43" name="Group 42"/>
-          <p:cNvGrpSpPr/>
+      <p:sp>
+        <p:nvSpPr>
+          <p:cNvPr id="42" name="Snip Diagonal Corner Rectangle 41"/>
+          <p:cNvSpPr/>
           <p:nvPr/>
-        </p:nvGrpSpPr>
-        <p:grpSpPr>
+        </p:nvSpPr>
+        <p:spPr>
           <a:xfrm>
-            <a:off x="4496304" y="607678"/>
-            <a:ext cx="6720145" cy="3092844"/>
-            <a:chOff x="2805119" y="3707947"/>
-            <a:chExt cx="6720145" cy="3092844"/>
-          </a:xfrm>
-        </p:grpSpPr>
-        <p:sp>
-          <p:nvSpPr>
-            <p:cNvPr id="42" name="Snip Diagonal Corner Rectangle 41"/>
-            <p:cNvSpPr/>
-            <p:nvPr/>
-          </p:nvSpPr>
-          <p:spPr>
-            <a:xfrm>
-              <a:off x="2805119" y="3707947"/>
-              <a:ext cx="6720145" cy="3092844"/>
-            </a:xfrm>
-            <a:prstGeom prst="snip2DiagRect">
-              <a:avLst/>
-            </a:prstGeom>
-            <a:solidFill>
-              <a:schemeClr val="accent1">
-                <a:lumMod val="20000"/>
-                <a:lumOff val="80000"/>
-              </a:schemeClr>
-            </a:solidFill>
-          </p:spPr>
-          <p:style>
-            <a:lnRef idx="2">
-              <a:schemeClr val="accent1">
-                <a:shade val="50000"/>
-              </a:schemeClr>
-            </a:lnRef>
-            <a:fillRef idx="1">
-              <a:schemeClr val="accent1"/>
-            </a:fillRef>
-            <a:effectRef idx="0">
-              <a:schemeClr val="accent1"/>
-            </a:effectRef>
-            <a:fontRef idx="minor">
-              <a:schemeClr val="lt1"/>
-            </a:fontRef>
-          </p:style>
-          <p:txBody>
-            <a:bodyPr rtlCol="0" anchor="ctr"/>
-            <a:lstStyle/>
-            <a:p>
-              <a:pPr algn="ctr"/>
-              <a:endParaRPr lang="en-AU" sz="1200"/>
-            </a:p>
-          </p:txBody>
-        </p:sp>
-        <p:pic>
-          <p:nvPicPr>
-            <p:cNvPr id="4" name="Picture 3"/>
-            <p:cNvPicPr>
-              <a:picLocks noChangeAspect="1"/>
-            </p:cNvPicPr>
-            <p:nvPr/>
-          </p:nvPicPr>
-          <p:blipFill>
-            <a:blip r:embed="rId3"/>
-            <a:stretch>
-              <a:fillRect/>
-            </a:stretch>
-          </p:blipFill>
-          <p:spPr>
-            <a:xfrm>
-              <a:off x="3115418" y="4438642"/>
-              <a:ext cx="1516132" cy="758883"/>
-            </a:xfrm>
-            <a:prstGeom prst="rect">
-              <a:avLst/>
-            </a:prstGeom>
-          </p:spPr>
-        </p:pic>
-        <p:pic>
-          <p:nvPicPr>
-            <p:cNvPr id="6" name="Picture 5"/>
-            <p:cNvPicPr>
-              <a:picLocks noChangeAspect="1"/>
-            </p:cNvPicPr>
-            <p:nvPr/>
-          </p:nvPicPr>
-          <p:blipFill>
-            <a:blip r:embed="rId4"/>
-            <a:stretch>
-              <a:fillRect/>
-            </a:stretch>
-          </p:blipFill>
-          <p:spPr>
-            <a:xfrm>
-              <a:off x="3132982" y="5609633"/>
-              <a:ext cx="1516132" cy="883974"/>
-            </a:xfrm>
-            <a:prstGeom prst="rect">
-              <a:avLst/>
-            </a:prstGeom>
-          </p:spPr>
-        </p:pic>
-        <p:sp>
-          <p:nvSpPr>
-            <p:cNvPr id="7" name="TextBox 6"/>
-            <p:cNvSpPr txBox="1"/>
-            <p:nvPr/>
-          </p:nvSpPr>
-          <p:spPr>
-            <a:xfrm>
-              <a:off x="2926915" y="3772833"/>
-              <a:ext cx="3149004" cy="461665"/>
-            </a:xfrm>
-            <a:prstGeom prst="rect">
-              <a:avLst/>
-            </a:prstGeom>
-            <a:noFill/>
-          </p:spPr>
-          <p:txBody>
-            <a:bodyPr wrap="none" rtlCol="0">
-              <a:spAutoFit/>
-            </a:bodyPr>
-            <a:lstStyle/>
-            <a:p>
-              <a:r>
-                <a:rPr lang="en-AU" sz="1200" b="1" dirty="0" smtClean="0"/>
-                <a:t>APSIM.Cloud.JobRunner.exe</a:t>
-              </a:r>
-            </a:p>
-            <a:p>
-              <a:r>
-                <a:rPr lang="en-AU" sz="1200" dirty="0" smtClean="0"/>
-                <a:t>Looks at jobs database and runs </a:t>
-              </a:r>
-              <a:r>
-                <a:rPr lang="en-AU" sz="1200" dirty="0" smtClean="0"/>
-                <a:t>all jobs it finds.</a:t>
-              </a:r>
-              <a:endParaRPr lang="en-AU" sz="1200" dirty="0"/>
-            </a:p>
-          </p:txBody>
-        </p:sp>
-        <p:sp>
-          <p:nvSpPr>
-            <p:cNvPr id="8" name="TextBox 7"/>
-            <p:cNvSpPr txBox="1"/>
-            <p:nvPr/>
-          </p:nvSpPr>
-          <p:spPr>
-            <a:xfrm>
-              <a:off x="2927281" y="5262055"/>
-              <a:ext cx="1447512" cy="276999"/>
-            </a:xfrm>
-            <a:prstGeom prst="rect">
-              <a:avLst/>
-            </a:prstGeom>
-            <a:noFill/>
-          </p:spPr>
-          <p:txBody>
-            <a:bodyPr wrap="none" rtlCol="0">
-              <a:spAutoFit/>
-            </a:bodyPr>
-            <a:lstStyle/>
-            <a:p>
-              <a:pPr algn="ctr"/>
-              <a:r>
-                <a:rPr lang="en-AU" sz="1200" dirty="0" smtClean="0"/>
-                <a:t>Creates a main form</a:t>
-              </a:r>
-              <a:endParaRPr lang="en-AU" sz="1200" dirty="0"/>
-            </a:p>
-          </p:txBody>
-        </p:sp>
-        <p:pic>
-          <p:nvPicPr>
-            <p:cNvPr id="11" name="Picture 10"/>
-            <p:cNvPicPr>
-              <a:picLocks noChangeAspect="1"/>
-            </p:cNvPicPr>
-            <p:nvPr/>
-          </p:nvPicPr>
-          <p:blipFill>
-            <a:blip r:embed="rId5"/>
-            <a:stretch>
-              <a:fillRect/>
-            </a:stretch>
-          </p:blipFill>
-          <p:spPr>
-            <a:xfrm>
-              <a:off x="5398376" y="4550259"/>
-              <a:ext cx="1516132" cy="758883"/>
-            </a:xfrm>
-            <a:prstGeom prst="rect">
-              <a:avLst/>
-            </a:prstGeom>
-          </p:spPr>
-        </p:pic>
-        <p:sp>
-          <p:nvSpPr>
-            <p:cNvPr id="12" name="TextBox 11"/>
-            <p:cNvSpPr txBox="1"/>
-            <p:nvPr/>
-          </p:nvSpPr>
-          <p:spPr>
-            <a:xfrm>
-              <a:off x="4890675" y="5509693"/>
-              <a:ext cx="1712648" cy="830997"/>
-            </a:xfrm>
-            <a:prstGeom prst="rect">
-              <a:avLst/>
-            </a:prstGeom>
-            <a:noFill/>
-          </p:spPr>
-          <p:txBody>
-            <a:bodyPr wrap="none" rtlCol="0">
-              <a:spAutoFit/>
-            </a:bodyPr>
-            <a:lstStyle/>
-            <a:p>
-              <a:pPr algn="ctr"/>
-              <a:r>
-                <a:rPr lang="en-AU" sz="1200" dirty="0" smtClean="0"/>
-                <a:t>Creates an instance </a:t>
-              </a:r>
-            </a:p>
-            <a:p>
-              <a:pPr algn="ctr"/>
-              <a:r>
-                <a:rPr lang="en-AU" sz="1200" dirty="0" smtClean="0"/>
-                <a:t>of </a:t>
-              </a:r>
-              <a:r>
-                <a:rPr lang="en-AU" sz="1200" dirty="0" err="1" smtClean="0"/>
-                <a:t>JobManager</a:t>
-              </a:r>
-              <a:r>
-                <a:rPr lang="en-AU" sz="1200" dirty="0" smtClean="0"/>
-                <a:t> and then</a:t>
-              </a:r>
-            </a:p>
-            <a:p>
-              <a:pPr algn="ctr"/>
-              <a:r>
-                <a:rPr lang="en-US" sz="1200" dirty="0" smtClean="0"/>
-                <a:t>Adds a </a:t>
-              </a:r>
-              <a:r>
-                <a:rPr lang="en-US" sz="1200" dirty="0" smtClean="0"/>
-                <a:t>new job </a:t>
-              </a:r>
-            </a:p>
-            <a:p>
-              <a:pPr algn="ctr"/>
-              <a:r>
-                <a:rPr lang="en-US" sz="1200" dirty="0" smtClean="0"/>
-                <a:t>‘</a:t>
-              </a:r>
-              <a:r>
-                <a:rPr lang="en-US" sz="1200" dirty="0" err="1" smtClean="0"/>
-                <a:t>CheckDBForJobs</a:t>
-              </a:r>
-              <a:r>
-                <a:rPr lang="en-US" sz="1200" dirty="0" smtClean="0"/>
-                <a:t>’</a:t>
-              </a:r>
-              <a:endParaRPr lang="en-AU" sz="1200" dirty="0"/>
-            </a:p>
-          </p:txBody>
-        </p:sp>
-        <p:sp>
-          <p:nvSpPr>
-            <p:cNvPr id="15" name="TextBox 14"/>
-            <p:cNvSpPr txBox="1"/>
-            <p:nvPr/>
-          </p:nvSpPr>
-          <p:spPr>
-            <a:xfrm>
-              <a:off x="8015087" y="5443605"/>
-              <a:ext cx="1455770" cy="646331"/>
-            </a:xfrm>
-            <a:prstGeom prst="rect">
-              <a:avLst/>
-            </a:prstGeom>
-            <a:noFill/>
-          </p:spPr>
-          <p:txBody>
-            <a:bodyPr wrap="square" rtlCol="0">
-              <a:spAutoFit/>
-            </a:bodyPr>
-            <a:lstStyle/>
-            <a:p>
-              <a:pPr algn="ctr"/>
-              <a:r>
-                <a:rPr lang="en-AU" sz="1200" dirty="0" smtClean="0"/>
-                <a:t>Cr</a:t>
-              </a:r>
-              <a:r>
-                <a:rPr lang="en-AU" sz="1200" dirty="0" smtClean="0"/>
-                <a:t>eates </a:t>
-              </a:r>
-              <a:r>
-                <a:rPr lang="en-AU" sz="1200" dirty="0" smtClean="0"/>
-                <a:t>a new </a:t>
-              </a:r>
-              <a:r>
-                <a:rPr lang="en-AU" sz="1200" dirty="0" err="1" smtClean="0"/>
-                <a:t>RunAPSIM</a:t>
-              </a:r>
-              <a:r>
-                <a:rPr lang="en-AU" sz="1200" dirty="0" err="1" smtClean="0"/>
-                <a:t>Job</a:t>
-              </a:r>
-              <a:endParaRPr lang="en-AU" sz="1200" dirty="0" smtClean="0"/>
-            </a:p>
-            <a:p>
-              <a:pPr algn="ctr"/>
-              <a:r>
-                <a:rPr lang="en-US" sz="1200" dirty="0"/>
-                <a:t>f</a:t>
-              </a:r>
-              <a:r>
-                <a:rPr lang="en-US" sz="1200" dirty="0" smtClean="0"/>
-                <a:t>or each YP report</a:t>
-              </a:r>
-              <a:endParaRPr lang="en-AU" sz="1200" dirty="0"/>
-            </a:p>
-          </p:txBody>
-        </p:sp>
-        <p:sp>
-          <p:nvSpPr>
-            <p:cNvPr id="24" name="TextBox 23"/>
-            <p:cNvSpPr txBox="1"/>
-            <p:nvPr/>
-          </p:nvSpPr>
-          <p:spPr>
-            <a:xfrm>
-              <a:off x="7125605" y="3848049"/>
-              <a:ext cx="2360710" cy="646331"/>
-            </a:xfrm>
-            <a:prstGeom prst="rect">
-              <a:avLst/>
-            </a:prstGeom>
-            <a:noFill/>
-          </p:spPr>
-          <p:txBody>
-            <a:bodyPr wrap="none" rtlCol="0">
-              <a:spAutoFit/>
-            </a:bodyPr>
-            <a:lstStyle/>
-            <a:p>
-              <a:pPr algn="ctr"/>
-              <a:r>
-                <a:rPr lang="en-US" sz="1200" dirty="0" smtClean="0"/>
-                <a:t>Checks the DB looking for</a:t>
-              </a:r>
-            </a:p>
-            <a:p>
-              <a:pPr algn="ctr"/>
-              <a:r>
-                <a:rPr lang="en-US" sz="1200" dirty="0" smtClean="0"/>
-                <a:t>YP jobs</a:t>
-              </a:r>
-              <a:r>
-                <a:rPr lang="en-US" sz="1200" dirty="0" smtClean="0"/>
-                <a:t>. </a:t>
-              </a:r>
-            </a:p>
-            <a:p>
-              <a:pPr algn="ctr"/>
-              <a:r>
-                <a:rPr lang="en-US" sz="1200" dirty="0" smtClean="0"/>
-                <a:t>Uses </a:t>
-              </a:r>
-              <a:r>
-                <a:rPr lang="en-US" sz="1200" dirty="0" err="1" smtClean="0"/>
-                <a:t>APSIM.Cloud.Services.JobsDB</a:t>
-              </a:r>
-              <a:endParaRPr lang="en-AU" sz="1200" dirty="0"/>
-            </a:p>
-          </p:txBody>
-        </p:sp>
-        <p:cxnSp>
-          <p:nvCxnSpPr>
-            <p:cNvPr id="27" name="Straight Arrow Connector 26"/>
-            <p:cNvCxnSpPr/>
-            <p:nvPr/>
-          </p:nvCxnSpPr>
-          <p:spPr>
-            <a:xfrm>
-              <a:off x="6990215" y="4951945"/>
-              <a:ext cx="645100" cy="0"/>
-            </a:xfrm>
-            <a:prstGeom prst="straightConnector1">
-              <a:avLst/>
-            </a:prstGeom>
-            <a:ln w="31750">
-              <a:tailEnd type="triangle"/>
-            </a:ln>
-          </p:spPr>
-          <p:style>
-            <a:lnRef idx="1">
-              <a:schemeClr val="accent1"/>
-            </a:lnRef>
-            <a:fillRef idx="0">
-              <a:schemeClr val="accent1"/>
-            </a:fillRef>
-            <a:effectRef idx="0">
-              <a:schemeClr val="accent1"/>
-            </a:effectRef>
-            <a:fontRef idx="minor">
-              <a:schemeClr val="tx1"/>
-            </a:fontRef>
-          </p:style>
-        </p:cxnSp>
-        <p:cxnSp>
-          <p:nvCxnSpPr>
-            <p:cNvPr id="28" name="Straight Arrow Connector 27"/>
-            <p:cNvCxnSpPr/>
-            <p:nvPr/>
-          </p:nvCxnSpPr>
-          <p:spPr>
-            <a:xfrm flipH="1">
-              <a:off x="4455330" y="5220171"/>
-              <a:ext cx="1191" cy="389462"/>
-            </a:xfrm>
-            <a:prstGeom prst="straightConnector1">
-              <a:avLst/>
-            </a:prstGeom>
-            <a:ln w="31750">
-              <a:tailEnd type="triangle"/>
-            </a:ln>
-          </p:spPr>
-          <p:style>
-            <a:lnRef idx="1">
-              <a:schemeClr val="accent1"/>
-            </a:lnRef>
-            <a:fillRef idx="0">
-              <a:schemeClr val="accent1"/>
-            </a:fillRef>
-            <a:effectRef idx="0">
-              <a:schemeClr val="accent1"/>
-            </a:effectRef>
-            <a:fontRef idx="minor">
-              <a:schemeClr val="tx1"/>
-            </a:fontRef>
-          </p:style>
-        </p:cxnSp>
-        <p:cxnSp>
-          <p:nvCxnSpPr>
-            <p:cNvPr id="32" name="Straight Arrow Connector 31"/>
-            <p:cNvCxnSpPr/>
-            <p:nvPr/>
-          </p:nvCxnSpPr>
-          <p:spPr>
-            <a:xfrm flipV="1">
-              <a:off x="4752095" y="4929701"/>
-              <a:ext cx="634325" cy="1021416"/>
-            </a:xfrm>
-            <a:prstGeom prst="straightConnector1">
-              <a:avLst/>
-            </a:prstGeom>
-            <a:ln w="31750">
-              <a:tailEnd type="triangle"/>
-            </a:ln>
-          </p:spPr>
-          <p:style>
-            <a:lnRef idx="1">
-              <a:schemeClr val="accent1"/>
-            </a:lnRef>
-            <a:fillRef idx="0">
-              <a:schemeClr val="accent1"/>
-            </a:fillRef>
-            <a:effectRef idx="0">
-              <a:schemeClr val="accent1"/>
-            </a:effectRef>
-            <a:fontRef idx="minor">
-              <a:schemeClr val="tx1"/>
-            </a:fontRef>
-          </p:style>
-        </p:cxnSp>
-        <p:cxnSp>
-          <p:nvCxnSpPr>
-            <p:cNvPr id="34" name="Straight Arrow Connector 33"/>
-            <p:cNvCxnSpPr/>
-            <p:nvPr/>
-          </p:nvCxnSpPr>
-          <p:spPr>
-            <a:xfrm>
-              <a:off x="8015087" y="5396788"/>
-              <a:ext cx="0" cy="650561"/>
-            </a:xfrm>
-            <a:prstGeom prst="straightConnector1">
-              <a:avLst/>
-            </a:prstGeom>
-            <a:ln w="31750">
-              <a:tailEnd type="triangle"/>
-            </a:ln>
-          </p:spPr>
-          <p:style>
-            <a:lnRef idx="1">
-              <a:schemeClr val="accent1"/>
-            </a:lnRef>
-            <a:fillRef idx="0">
-              <a:schemeClr val="accent1"/>
-            </a:fillRef>
-            <a:effectRef idx="0">
-              <a:schemeClr val="accent1"/>
-            </a:effectRef>
-            <a:fontRef idx="minor">
-              <a:schemeClr val="tx1"/>
-            </a:fontRef>
-          </p:style>
-        </p:cxnSp>
-        <p:pic>
-          <p:nvPicPr>
-            <p:cNvPr id="23" name="Picture 22"/>
-            <p:cNvPicPr>
-              <a:picLocks noChangeAspect="1"/>
-            </p:cNvPicPr>
-            <p:nvPr/>
-          </p:nvPicPr>
-          <p:blipFill>
-            <a:blip r:embed="rId6"/>
-            <a:stretch>
-              <a:fillRect/>
-            </a:stretch>
-          </p:blipFill>
-          <p:spPr>
-            <a:xfrm>
-              <a:off x="7833900" y="6089936"/>
-              <a:ext cx="1519060" cy="568632"/>
-            </a:xfrm>
-            <a:prstGeom prst="rect">
-              <a:avLst/>
-            </a:prstGeom>
-          </p:spPr>
-        </p:pic>
-        <p:pic>
-          <p:nvPicPr>
-            <p:cNvPr id="26" name="Picture 25"/>
-            <p:cNvPicPr>
-              <a:picLocks noChangeAspect="1"/>
-            </p:cNvPicPr>
-            <p:nvPr/>
-          </p:nvPicPr>
-          <p:blipFill>
-            <a:blip r:embed="rId7"/>
-            <a:stretch>
-              <a:fillRect/>
-            </a:stretch>
-          </p:blipFill>
-          <p:spPr>
-            <a:xfrm>
-              <a:off x="7704246" y="4646227"/>
-              <a:ext cx="1576893" cy="598713"/>
-            </a:xfrm>
-            <a:prstGeom prst="rect">
-              <a:avLst/>
-            </a:prstGeom>
-          </p:spPr>
-        </p:pic>
-      </p:grpSp>
+            <a:off x="4496823" y="615364"/>
+            <a:ext cx="6720145" cy="3485388"/>
+          </a:xfrm>
+          <a:prstGeom prst="snip2DiagRect">
+            <a:avLst/>
+          </a:prstGeom>
+          <a:solidFill>
+            <a:schemeClr val="accent1">
+              <a:lumMod val="20000"/>
+              <a:lumOff val="80000"/>
+            </a:schemeClr>
+          </a:solidFill>
+        </p:spPr>
+        <p:style>
+          <a:lnRef idx="2">
+            <a:schemeClr val="accent1">
+              <a:shade val="50000"/>
+            </a:schemeClr>
+          </a:lnRef>
+          <a:fillRef idx="1">
+            <a:schemeClr val="accent1"/>
+          </a:fillRef>
+          <a:effectRef idx="0">
+            <a:schemeClr val="accent1"/>
+          </a:effectRef>
+          <a:fontRef idx="minor">
+            <a:schemeClr val="lt1"/>
+          </a:fontRef>
+        </p:style>
+        <p:txBody>
+          <a:bodyPr rtlCol="0" anchor="ctr"/>
+          <a:lstStyle/>
+          <a:p>
+            <a:pPr algn="ctr"/>
+            <a:endParaRPr lang="en-AU" sz="1200"/>
+          </a:p>
+        </p:txBody>
+      </p:sp>
+      <p:pic>
+        <p:nvPicPr>
+          <p:cNvPr id="4" name="Picture 3"/>
+          <p:cNvPicPr>
+            <a:picLocks noChangeAspect="1"/>
+          </p:cNvPicPr>
+          <p:nvPr/>
+        </p:nvPicPr>
+        <p:blipFill>
+          <a:blip r:embed="rId2"/>
+          <a:stretch>
+            <a:fillRect/>
+          </a:stretch>
+        </p:blipFill>
+        <p:spPr>
+          <a:xfrm>
+            <a:off x="4806603" y="1338373"/>
+            <a:ext cx="1516132" cy="758883"/>
+          </a:xfrm>
+          <a:prstGeom prst="rect">
+            <a:avLst/>
+          </a:prstGeom>
+        </p:spPr>
+      </p:pic>
+      <p:pic>
+        <p:nvPicPr>
+          <p:cNvPr id="6" name="Picture 5"/>
+          <p:cNvPicPr>
+            <a:picLocks noChangeAspect="1"/>
+          </p:cNvPicPr>
+          <p:nvPr/>
+        </p:nvPicPr>
+        <p:blipFill>
+          <a:blip r:embed="rId3"/>
+          <a:stretch>
+            <a:fillRect/>
+          </a:stretch>
+        </p:blipFill>
+        <p:spPr>
+          <a:xfrm>
+            <a:off x="4824167" y="2509364"/>
+            <a:ext cx="1516132" cy="883974"/>
+          </a:xfrm>
+          <a:prstGeom prst="rect">
+            <a:avLst/>
+          </a:prstGeom>
+        </p:spPr>
+      </p:pic>
+      <p:sp>
+        <p:nvSpPr>
+          <p:cNvPr id="7" name="TextBox 6"/>
+          <p:cNvSpPr txBox="1"/>
+          <p:nvPr/>
+        </p:nvSpPr>
+        <p:spPr>
+          <a:xfrm>
+            <a:off x="4618100" y="672564"/>
+            <a:ext cx="3149004" cy="461665"/>
+          </a:xfrm>
+          <a:prstGeom prst="rect">
+            <a:avLst/>
+          </a:prstGeom>
+          <a:noFill/>
+        </p:spPr>
+        <p:txBody>
+          <a:bodyPr wrap="none" rtlCol="0">
+            <a:spAutoFit/>
+          </a:bodyPr>
+          <a:lstStyle/>
+          <a:p>
+            <a:r>
+              <a:rPr lang="en-AU" sz="1200" b="1" dirty="0" smtClean="0"/>
+              <a:t>APSIM.Cloud.Runner.exe</a:t>
+            </a:r>
+            <a:endParaRPr lang="en-AU" sz="1200" b="1" dirty="0" smtClean="0"/>
+          </a:p>
+          <a:p>
+            <a:r>
+              <a:rPr lang="en-AU" sz="1200" dirty="0" smtClean="0"/>
+              <a:t>Looks at jobs database and runs all jobs it finds.</a:t>
+            </a:r>
+            <a:endParaRPr lang="en-AU" sz="1200" dirty="0"/>
+          </a:p>
+        </p:txBody>
+      </p:sp>
+      <p:sp>
+        <p:nvSpPr>
+          <p:cNvPr id="8" name="TextBox 7"/>
+          <p:cNvSpPr txBox="1"/>
+          <p:nvPr/>
+        </p:nvSpPr>
+        <p:spPr>
+          <a:xfrm>
+            <a:off x="4618466" y="2161786"/>
+            <a:ext cx="1447512" cy="276999"/>
+          </a:xfrm>
+          <a:prstGeom prst="rect">
+            <a:avLst/>
+          </a:prstGeom>
+          <a:noFill/>
+        </p:spPr>
+        <p:txBody>
+          <a:bodyPr wrap="none" rtlCol="0">
+            <a:spAutoFit/>
+          </a:bodyPr>
+          <a:lstStyle/>
+          <a:p>
+            <a:pPr algn="ctr"/>
+            <a:r>
+              <a:rPr lang="en-AU" sz="1200" dirty="0" smtClean="0"/>
+              <a:t>Creates a main form</a:t>
+            </a:r>
+            <a:endParaRPr lang="en-AU" sz="1200" dirty="0"/>
+          </a:p>
+        </p:txBody>
+      </p:sp>
+      <p:pic>
+        <p:nvPicPr>
+          <p:cNvPr id="11" name="Picture 10"/>
+          <p:cNvPicPr>
+            <a:picLocks noChangeAspect="1"/>
+          </p:cNvPicPr>
+          <p:nvPr/>
+        </p:nvPicPr>
+        <p:blipFill>
+          <a:blip r:embed="rId4"/>
+          <a:stretch>
+            <a:fillRect/>
+          </a:stretch>
+        </p:blipFill>
+        <p:spPr>
+          <a:xfrm>
+            <a:off x="7089561" y="1449990"/>
+            <a:ext cx="1516132" cy="758883"/>
+          </a:xfrm>
+          <a:prstGeom prst="rect">
+            <a:avLst/>
+          </a:prstGeom>
+        </p:spPr>
+      </p:pic>
+      <p:sp>
+        <p:nvSpPr>
+          <p:cNvPr id="12" name="TextBox 11"/>
+          <p:cNvSpPr txBox="1"/>
+          <p:nvPr/>
+        </p:nvSpPr>
+        <p:spPr>
+          <a:xfrm>
+            <a:off x="6575033" y="2409424"/>
+            <a:ext cx="1726305" cy="830997"/>
+          </a:xfrm>
+          <a:prstGeom prst="rect">
+            <a:avLst/>
+          </a:prstGeom>
+          <a:noFill/>
+        </p:spPr>
+        <p:txBody>
+          <a:bodyPr wrap="none" rtlCol="0">
+            <a:spAutoFit/>
+          </a:bodyPr>
+          <a:lstStyle/>
+          <a:p>
+            <a:pPr algn="ctr"/>
+            <a:r>
+              <a:rPr lang="en-AU" sz="1200" dirty="0" smtClean="0"/>
+              <a:t>Creates an instance </a:t>
+            </a:r>
+          </a:p>
+          <a:p>
+            <a:pPr algn="ctr"/>
+            <a:r>
+              <a:rPr lang="en-AU" sz="1200" dirty="0" smtClean="0"/>
+              <a:t>of </a:t>
+            </a:r>
+            <a:r>
+              <a:rPr lang="en-AU" sz="1200" dirty="0" err="1" smtClean="0"/>
+              <a:t>JobManager</a:t>
+            </a:r>
+            <a:r>
+              <a:rPr lang="en-AU" sz="1200" dirty="0" smtClean="0"/>
+              <a:t> and then</a:t>
+            </a:r>
+          </a:p>
+          <a:p>
+            <a:pPr algn="ctr"/>
+            <a:r>
+              <a:rPr lang="en-US" sz="1200" dirty="0" smtClean="0"/>
+              <a:t>Adds a new job </a:t>
+            </a:r>
+          </a:p>
+          <a:p>
+            <a:pPr algn="ctr"/>
+            <a:r>
+              <a:rPr lang="en-US" sz="1200" dirty="0" smtClean="0"/>
+              <a:t>‘</a:t>
+            </a:r>
+            <a:r>
+              <a:rPr lang="en-US" sz="1200" dirty="0" err="1" smtClean="0"/>
+              <a:t>RunJobsInDB</a:t>
+            </a:r>
+            <a:r>
+              <a:rPr lang="en-US" sz="1200" dirty="0" smtClean="0"/>
+              <a:t>’</a:t>
+            </a:r>
+            <a:endParaRPr lang="en-AU" sz="1200" dirty="0"/>
+          </a:p>
+        </p:txBody>
+      </p:sp>
+      <p:sp>
+        <p:nvSpPr>
+          <p:cNvPr id="15" name="TextBox 14"/>
+          <p:cNvSpPr txBox="1"/>
+          <p:nvPr/>
+        </p:nvSpPr>
+        <p:spPr>
+          <a:xfrm>
+            <a:off x="9971601" y="2343336"/>
+            <a:ext cx="1245367" cy="646331"/>
+          </a:xfrm>
+          <a:prstGeom prst="rect">
+            <a:avLst/>
+          </a:prstGeom>
+          <a:noFill/>
+        </p:spPr>
+        <p:txBody>
+          <a:bodyPr wrap="square" rtlCol="0">
+            <a:spAutoFit/>
+          </a:bodyPr>
+          <a:lstStyle/>
+          <a:p>
+            <a:r>
+              <a:rPr lang="en-AU" sz="1200" dirty="0" smtClean="0"/>
+              <a:t>Creates a new </a:t>
+            </a:r>
+            <a:r>
+              <a:rPr lang="en-AU" sz="1200" dirty="0" err="1" smtClean="0"/>
+              <a:t>ProcessYPJob</a:t>
+            </a:r>
+            <a:r>
+              <a:rPr lang="en-AU" sz="1200" dirty="0" smtClean="0"/>
+              <a:t> </a:t>
+            </a:r>
+            <a:r>
+              <a:rPr lang="en-US" sz="1200" dirty="0" smtClean="0"/>
+              <a:t>for </a:t>
+            </a:r>
+            <a:r>
+              <a:rPr lang="en-US" sz="1200" dirty="0" smtClean="0"/>
+              <a:t>each YP report</a:t>
+            </a:r>
+            <a:endParaRPr lang="en-AU" sz="1200" dirty="0"/>
+          </a:p>
+        </p:txBody>
+      </p:sp>
+      <p:sp>
+        <p:nvSpPr>
+          <p:cNvPr id="24" name="TextBox 23"/>
+          <p:cNvSpPr txBox="1"/>
+          <p:nvPr/>
+        </p:nvSpPr>
+        <p:spPr>
+          <a:xfrm>
+            <a:off x="9106420" y="747780"/>
+            <a:ext cx="1781450" cy="461665"/>
+          </a:xfrm>
+          <a:prstGeom prst="rect">
+            <a:avLst/>
+          </a:prstGeom>
+          <a:noFill/>
+        </p:spPr>
+        <p:txBody>
+          <a:bodyPr wrap="none" rtlCol="0">
+            <a:spAutoFit/>
+          </a:bodyPr>
+          <a:lstStyle/>
+          <a:p>
+            <a:pPr algn="ctr"/>
+            <a:r>
+              <a:rPr lang="en-US" sz="1200" dirty="0" smtClean="0"/>
+              <a:t>Checks the DB looking for</a:t>
+            </a:r>
+          </a:p>
+          <a:p>
+            <a:pPr algn="ctr"/>
+            <a:r>
+              <a:rPr lang="en-US" sz="1200" dirty="0" smtClean="0"/>
+              <a:t>YP jobs. </a:t>
+            </a:r>
+          </a:p>
+        </p:txBody>
+      </p:sp>
+      <p:cxnSp>
+        <p:nvCxnSpPr>
+          <p:cNvPr id="27" name="Straight Arrow Connector 26"/>
+          <p:cNvCxnSpPr/>
+          <p:nvPr/>
+        </p:nvCxnSpPr>
+        <p:spPr>
+          <a:xfrm>
+            <a:off x="8681400" y="1851676"/>
+            <a:ext cx="645100" cy="0"/>
+          </a:xfrm>
+          <a:prstGeom prst="straightConnector1">
+            <a:avLst/>
+          </a:prstGeom>
+          <a:ln w="31750">
+            <a:tailEnd type="triangle"/>
+          </a:ln>
+        </p:spPr>
+        <p:style>
+          <a:lnRef idx="1">
+            <a:schemeClr val="accent1"/>
+          </a:lnRef>
+          <a:fillRef idx="0">
+            <a:schemeClr val="accent1"/>
+          </a:fillRef>
+          <a:effectRef idx="0">
+            <a:schemeClr val="accent1"/>
+          </a:effectRef>
+          <a:fontRef idx="minor">
+            <a:schemeClr val="tx1"/>
+          </a:fontRef>
+        </p:style>
+      </p:cxnSp>
+      <p:cxnSp>
+        <p:nvCxnSpPr>
+          <p:cNvPr id="28" name="Straight Arrow Connector 27"/>
+          <p:cNvCxnSpPr/>
+          <p:nvPr/>
+        </p:nvCxnSpPr>
+        <p:spPr>
+          <a:xfrm flipH="1">
+            <a:off x="6146515" y="2119902"/>
+            <a:ext cx="1191" cy="389462"/>
+          </a:xfrm>
+          <a:prstGeom prst="straightConnector1">
+            <a:avLst/>
+          </a:prstGeom>
+          <a:ln w="31750">
+            <a:tailEnd type="triangle"/>
+          </a:ln>
+        </p:spPr>
+        <p:style>
+          <a:lnRef idx="1">
+            <a:schemeClr val="accent1"/>
+          </a:lnRef>
+          <a:fillRef idx="0">
+            <a:schemeClr val="accent1"/>
+          </a:fillRef>
+          <a:effectRef idx="0">
+            <a:schemeClr val="accent1"/>
+          </a:effectRef>
+          <a:fontRef idx="minor">
+            <a:schemeClr val="tx1"/>
+          </a:fontRef>
+        </p:style>
+      </p:cxnSp>
+      <p:cxnSp>
+        <p:nvCxnSpPr>
+          <p:cNvPr id="32" name="Straight Arrow Connector 31"/>
+          <p:cNvCxnSpPr/>
+          <p:nvPr/>
+        </p:nvCxnSpPr>
+        <p:spPr>
+          <a:xfrm flipV="1">
+            <a:off x="6443280" y="1829432"/>
+            <a:ext cx="634325" cy="1021416"/>
+          </a:xfrm>
+          <a:prstGeom prst="straightConnector1">
+            <a:avLst/>
+          </a:prstGeom>
+          <a:ln w="31750">
+            <a:tailEnd type="triangle"/>
+          </a:ln>
+        </p:spPr>
+        <p:style>
+          <a:lnRef idx="1">
+            <a:schemeClr val="accent1"/>
+          </a:lnRef>
+          <a:fillRef idx="0">
+            <a:schemeClr val="accent1"/>
+          </a:fillRef>
+          <a:effectRef idx="0">
+            <a:schemeClr val="accent1"/>
+          </a:effectRef>
+          <a:fontRef idx="minor">
+            <a:schemeClr val="tx1"/>
+          </a:fontRef>
+        </p:style>
+      </p:cxnSp>
+      <p:cxnSp>
+        <p:nvCxnSpPr>
+          <p:cNvPr id="34" name="Straight Arrow Connector 33"/>
+          <p:cNvCxnSpPr/>
+          <p:nvPr/>
+        </p:nvCxnSpPr>
+        <p:spPr>
+          <a:xfrm>
+            <a:off x="9808413" y="2301309"/>
+            <a:ext cx="0" cy="650561"/>
+          </a:xfrm>
+          <a:prstGeom prst="straightConnector1">
+            <a:avLst/>
+          </a:prstGeom>
+          <a:ln w="31750">
+            <a:tailEnd type="triangle"/>
+          </a:ln>
+        </p:spPr>
+        <p:style>
+          <a:lnRef idx="1">
+            <a:schemeClr val="accent1"/>
+          </a:lnRef>
+          <a:fillRef idx="0">
+            <a:schemeClr val="accent1"/>
+          </a:fillRef>
+          <a:effectRef idx="0">
+            <a:schemeClr val="accent1"/>
+          </a:effectRef>
+          <a:fontRef idx="minor">
+            <a:schemeClr val="tx1"/>
+          </a:fontRef>
+        </p:style>
+      </p:cxnSp>
       <p:grpSp>
         <p:nvGrpSpPr>
           <p:cNvPr id="54" name="Group 53"/>
@@ -3970,7 +3798,7 @@
         </p:nvGrpSpPr>
         <p:grpSpPr>
           <a:xfrm>
-            <a:off x="286191" y="2377406"/>
+            <a:off x="319422" y="2915089"/>
             <a:ext cx="1956708" cy="1795048"/>
             <a:chOff x="9991642" y="3927300"/>
             <a:chExt cx="1956708" cy="1795048"/>
@@ -4070,7 +3898,7 @@
             <p:nvPr/>
           </p:nvPicPr>
           <p:blipFill>
-            <a:blip r:embed="rId8"/>
+            <a:blip r:embed="rId5"/>
             <a:stretch>
               <a:fillRect/>
             </a:stretch>
@@ -4085,6 +3913,281 @@
             </a:prstGeom>
           </p:spPr>
         </p:pic>
+      </p:grpSp>
+      <p:grpSp>
+        <p:nvGrpSpPr>
+          <p:cNvPr id="3" name="Group 2"/>
+          <p:cNvGrpSpPr/>
+          <p:nvPr/>
+        </p:nvGrpSpPr>
+        <p:grpSpPr>
+          <a:xfrm>
+            <a:off x="124959" y="188560"/>
+            <a:ext cx="2379407" cy="1973226"/>
+            <a:chOff x="124959" y="188560"/>
+            <a:chExt cx="2379407" cy="1973226"/>
+          </a:xfrm>
+        </p:grpSpPr>
+        <p:sp>
+          <p:nvSpPr>
+            <p:cNvPr id="20" name="Round Same Side Corner Rectangle 19"/>
+            <p:cNvSpPr/>
+            <p:nvPr/>
+          </p:nvSpPr>
+          <p:spPr>
+            <a:xfrm>
+              <a:off x="124959" y="188560"/>
+              <a:ext cx="2379407" cy="1973226"/>
+            </a:xfrm>
+            <a:prstGeom prst="round2SameRect">
+              <a:avLst/>
+            </a:prstGeom>
+            <a:solidFill>
+              <a:schemeClr val="accent1">
+                <a:lumMod val="20000"/>
+                <a:lumOff val="80000"/>
+              </a:schemeClr>
+            </a:solidFill>
+          </p:spPr>
+          <p:style>
+            <a:lnRef idx="2">
+              <a:schemeClr val="accent1">
+                <a:shade val="50000"/>
+              </a:schemeClr>
+            </a:lnRef>
+            <a:fillRef idx="1">
+              <a:schemeClr val="accent1"/>
+            </a:fillRef>
+            <a:effectRef idx="0">
+              <a:schemeClr val="accent1"/>
+            </a:effectRef>
+            <a:fontRef idx="minor">
+              <a:schemeClr val="lt1"/>
+            </a:fontRef>
+          </p:style>
+          <p:txBody>
+            <a:bodyPr rtlCol="0" anchor="ctr"/>
+            <a:lstStyle/>
+            <a:p>
+              <a:pPr algn="ctr"/>
+              <a:endParaRPr lang="en-AU" sz="1200"/>
+            </a:p>
+          </p:txBody>
+        </p:sp>
+        <p:pic>
+          <p:nvPicPr>
+            <p:cNvPr id="2" name="Picture 1"/>
+            <p:cNvPicPr>
+              <a:picLocks noChangeAspect="1"/>
+            </p:cNvPicPr>
+            <p:nvPr/>
+          </p:nvPicPr>
+          <p:blipFill>
+            <a:blip r:embed="rId6"/>
+            <a:stretch>
+              <a:fillRect/>
+            </a:stretch>
+          </p:blipFill>
+          <p:spPr>
+            <a:xfrm>
+              <a:off x="319422" y="919752"/>
+              <a:ext cx="1876425" cy="1200150"/>
+            </a:xfrm>
+            <a:prstGeom prst="rect">
+              <a:avLst/>
+            </a:prstGeom>
+          </p:spPr>
+        </p:pic>
+      </p:grpSp>
+      <p:pic>
+        <p:nvPicPr>
+          <p:cNvPr id="5" name="Picture 4"/>
+          <p:cNvPicPr>
+            <a:picLocks noChangeAspect="1"/>
+          </p:cNvPicPr>
+          <p:nvPr/>
+        </p:nvPicPr>
+        <p:blipFill>
+          <a:blip r:embed="rId7"/>
+          <a:stretch>
+            <a:fillRect/>
+          </a:stretch>
+        </p:blipFill>
+        <p:spPr>
+          <a:xfrm>
+            <a:off x="9326500" y="1364673"/>
+            <a:ext cx="1833891" cy="978663"/>
+          </a:xfrm>
+          <a:prstGeom prst="rect">
+            <a:avLst/>
+          </a:prstGeom>
+        </p:spPr>
+      </p:pic>
+      <p:pic>
+        <p:nvPicPr>
+          <p:cNvPr id="9" name="Picture 8"/>
+          <p:cNvPicPr>
+            <a:picLocks noChangeAspect="1"/>
+          </p:cNvPicPr>
+          <p:nvPr/>
+        </p:nvPicPr>
+        <p:blipFill>
+          <a:blip r:embed="rId8"/>
+          <a:stretch>
+            <a:fillRect/>
+          </a:stretch>
+        </p:blipFill>
+        <p:spPr>
+          <a:xfrm>
+            <a:off x="9216718" y="2993809"/>
+            <a:ext cx="2000250" cy="1066800"/>
+          </a:xfrm>
+          <a:prstGeom prst="rect">
+            <a:avLst/>
+          </a:prstGeom>
+        </p:spPr>
+      </p:pic>
+      <p:pic>
+        <p:nvPicPr>
+          <p:cNvPr id="10" name="Picture 9"/>
+          <p:cNvPicPr>
+            <a:picLocks noChangeAspect="1"/>
+          </p:cNvPicPr>
+          <p:nvPr/>
+        </p:nvPicPr>
+        <p:blipFill>
+          <a:blip r:embed="rId9"/>
+          <a:stretch>
+            <a:fillRect/>
+          </a:stretch>
+        </p:blipFill>
+        <p:spPr>
+          <a:xfrm>
+            <a:off x="8138477" y="5095920"/>
+            <a:ext cx="3219450" cy="1143000"/>
+          </a:xfrm>
+          <a:prstGeom prst="rect">
+            <a:avLst/>
+          </a:prstGeom>
+        </p:spPr>
+      </p:pic>
+      <p:pic>
+        <p:nvPicPr>
+          <p:cNvPr id="13" name="Picture 12"/>
+          <p:cNvPicPr>
+            <a:picLocks noChangeAspect="1"/>
+          </p:cNvPicPr>
+          <p:nvPr/>
+        </p:nvPicPr>
+        <p:blipFill>
+          <a:blip r:embed="rId10"/>
+          <a:stretch>
+            <a:fillRect/>
+          </a:stretch>
+        </p:blipFill>
+        <p:spPr>
+          <a:xfrm>
+            <a:off x="4758102" y="5464871"/>
+            <a:ext cx="3248025" cy="771525"/>
+          </a:xfrm>
+          <a:prstGeom prst="rect">
+            <a:avLst/>
+          </a:prstGeom>
+        </p:spPr>
+      </p:pic>
+      <p:grpSp>
+        <p:nvGrpSpPr>
+          <p:cNvPr id="39" name="Group 38"/>
+          <p:cNvGrpSpPr/>
+          <p:nvPr/>
+        </p:nvGrpSpPr>
+        <p:grpSpPr>
+          <a:xfrm>
+            <a:off x="4772812" y="4539957"/>
+            <a:ext cx="3189985" cy="539425"/>
+            <a:chOff x="9319256" y="2918031"/>
+            <a:chExt cx="3189985" cy="539425"/>
+          </a:xfrm>
+        </p:grpSpPr>
+        <p:sp>
+          <p:nvSpPr>
+            <p:cNvPr id="44" name="Can 43"/>
+            <p:cNvSpPr/>
+            <p:nvPr/>
+          </p:nvSpPr>
+          <p:spPr>
+            <a:xfrm>
+              <a:off x="9319256" y="2958174"/>
+              <a:ext cx="412015" cy="499282"/>
+            </a:xfrm>
+            <a:prstGeom prst="can">
+              <a:avLst/>
+            </a:prstGeom>
+          </p:spPr>
+          <p:style>
+            <a:lnRef idx="2">
+              <a:schemeClr val="accent1">
+                <a:shade val="50000"/>
+              </a:schemeClr>
+            </a:lnRef>
+            <a:fillRef idx="1">
+              <a:schemeClr val="accent1"/>
+            </a:fillRef>
+            <a:effectRef idx="0">
+              <a:schemeClr val="accent1"/>
+            </a:effectRef>
+            <a:fontRef idx="minor">
+              <a:schemeClr val="lt1"/>
+            </a:fontRef>
+          </p:style>
+          <p:txBody>
+            <a:bodyPr rtlCol="0" anchor="ctr"/>
+            <a:lstStyle/>
+            <a:p>
+              <a:pPr algn="ctr"/>
+              <a:endParaRPr lang="en-AU" sz="1200"/>
+            </a:p>
+          </p:txBody>
+        </p:sp>
+        <p:sp>
+          <p:nvSpPr>
+            <p:cNvPr id="45" name="TextBox 44"/>
+            <p:cNvSpPr txBox="1"/>
+            <p:nvPr/>
+          </p:nvSpPr>
+          <p:spPr>
+            <a:xfrm>
+              <a:off x="9430750" y="2918031"/>
+              <a:ext cx="3078491" cy="461665"/>
+            </a:xfrm>
+            <a:prstGeom prst="rect">
+              <a:avLst/>
+            </a:prstGeom>
+            <a:noFill/>
+          </p:spPr>
+          <p:txBody>
+            <a:bodyPr wrap="square" rtlCol="0">
+              <a:spAutoFit/>
+            </a:bodyPr>
+            <a:lstStyle/>
+            <a:p>
+              <a:pPr algn="ctr"/>
+              <a:r>
+                <a:rPr lang="en-US" sz="1200" b="1" dirty="0" smtClean="0"/>
+                <a:t>Log Table: </a:t>
+              </a:r>
+              <a:endParaRPr lang="en-US" sz="1200" b="1" dirty="0" smtClean="0"/>
+            </a:p>
+            <a:p>
+              <a:pPr algn="ctr"/>
+              <a:r>
+                <a:rPr lang="en-US" sz="1200" dirty="0" smtClean="0"/>
+                <a:t>Contains a log of all errors.</a:t>
+              </a:r>
+              <a:endParaRPr lang="en-US" sz="1200" dirty="0" smtClean="0"/>
+            </a:p>
+          </p:txBody>
+        </p:sp>
       </p:grpSp>
     </p:spTree>
     <p:extLst>

</xml_diff>